<commit_message>
User Operation Perform By Admin
</commit_message>
<xml_diff>
--- a/Photos/PPT.pptx
+++ b/Photos/PPT.pptx
@@ -10,8 +10,12 @@
     <p:sldId id="258" r:id="rId4"/>
     <p:sldId id="259" r:id="rId5"/>
     <p:sldId id="260" r:id="rId6"/>
-    <p:sldId id="261" r:id="rId7"/>
-    <p:sldId id="262" r:id="rId8"/>
+    <p:sldId id="265" r:id="rId7"/>
+    <p:sldId id="261" r:id="rId8"/>
+    <p:sldId id="262" r:id="rId9"/>
+    <p:sldId id="263" r:id="rId10"/>
+    <p:sldId id="264" r:id="rId11"/>
+    <p:sldId id="266" r:id="rId12"/>
   </p:sldIdLst>
   <p:sldSz cx="12192000" cy="6858000"/>
   <p:notesSz cx="6858000" cy="9144000"/>
@@ -864,7 +868,7 @@
             <a:fld id="{B61BEF0D-F0BB-DE4B-95CE-6DB70DBA9567}" type="datetimeFigureOut">
               <a:rPr lang="en-US" dirty="0"/>
               <a:pPr/>
-              <a:t>12/14/2024</a:t>
+              <a:t>12/15/2024</a:t>
             </a:fld>
             <a:endParaRPr lang="en-US" dirty="0"/>
           </a:p>
@@ -1112,7 +1116,7 @@
             <a:fld id="{B61BEF0D-F0BB-DE4B-95CE-6DB70DBA9567}" type="datetimeFigureOut">
               <a:rPr lang="en-US" dirty="0"/>
               <a:pPr/>
-              <a:t>12/14/2024</a:t>
+              <a:t>12/15/2024</a:t>
             </a:fld>
             <a:endParaRPr lang="en-US" dirty="0"/>
           </a:p>
@@ -1423,7 +1427,7 @@
             <a:fld id="{B61BEF0D-F0BB-DE4B-95CE-6DB70DBA9567}" type="datetimeFigureOut">
               <a:rPr lang="en-US" dirty="0"/>
               <a:pPr/>
-              <a:t>12/14/2024</a:t>
+              <a:t>12/15/2024</a:t>
             </a:fld>
             <a:endParaRPr lang="en-US" dirty="0"/>
           </a:p>
@@ -1753,7 +1757,7 @@
             <a:fld id="{B61BEF0D-F0BB-DE4B-95CE-6DB70DBA9567}" type="datetimeFigureOut">
               <a:rPr lang="en-US" dirty="0"/>
               <a:pPr/>
-              <a:t>12/14/2024</a:t>
+              <a:t>12/15/2024</a:t>
             </a:fld>
             <a:endParaRPr lang="en-US" dirty="0"/>
           </a:p>
@@ -2064,7 +2068,7 @@
             <a:fld id="{B61BEF0D-F0BB-DE4B-95CE-6DB70DBA9567}" type="datetimeFigureOut">
               <a:rPr lang="en-US" dirty="0"/>
               <a:pPr/>
-              <a:t>12/14/2024</a:t>
+              <a:t>12/15/2024</a:t>
             </a:fld>
             <a:endParaRPr lang="en-US" dirty="0"/>
           </a:p>
@@ -2454,7 +2458,7 @@
             <a:fld id="{B61BEF0D-F0BB-DE4B-95CE-6DB70DBA9567}" type="datetimeFigureOut">
               <a:rPr lang="en-US" dirty="0"/>
               <a:pPr/>
-              <a:t>12/14/2024</a:t>
+              <a:t>12/15/2024</a:t>
             </a:fld>
             <a:endParaRPr lang="en-US" dirty="0"/>
           </a:p>
@@ -2620,7 +2624,7 @@
           <a:p>
             <a:fld id="{55C6B4A9-1611-4792-9094-5F34BCA07E0B}" type="datetimeFigureOut">
               <a:rPr lang="en-US" dirty="0"/>
-              <a:t>12/14/2024</a:t>
+              <a:t>12/15/2024</a:t>
             </a:fld>
             <a:endParaRPr lang="en-US" dirty="0"/>
           </a:p>
@@ -2796,7 +2800,7 @@
             <a:fld id="{B61BEF0D-F0BB-DE4B-95CE-6DB70DBA9567}" type="datetimeFigureOut">
               <a:rPr lang="en-US" dirty="0"/>
               <a:pPr/>
-              <a:t>12/14/2024</a:t>
+              <a:t>12/15/2024</a:t>
             </a:fld>
             <a:endParaRPr lang="en-US" dirty="0"/>
           </a:p>
@@ -2962,7 +2966,7 @@
           <a:p>
             <a:fld id="{42A54C80-263E-416B-A8E0-580EDEADCBDC}" type="datetimeFigureOut">
               <a:rPr lang="en-US" dirty="0"/>
-              <a:t>12/14/2024</a:t>
+              <a:t>12/15/2024</a:t>
             </a:fld>
             <a:endParaRPr lang="en-US" dirty="0"/>
           </a:p>
@@ -3205,7 +3209,7 @@
             <a:fld id="{B61BEF0D-F0BB-DE4B-95CE-6DB70DBA9567}" type="datetimeFigureOut">
               <a:rPr lang="en-US" dirty="0"/>
               <a:pPr/>
-              <a:t>12/14/2024</a:t>
+              <a:t>12/15/2024</a:t>
             </a:fld>
             <a:endParaRPr lang="en-US" dirty="0"/>
           </a:p>
@@ -3433,7 +3437,7 @@
           <a:p>
             <a:fld id="{42A54C80-263E-416B-A8E0-580EDEADCBDC}" type="datetimeFigureOut">
               <a:rPr lang="en-US" dirty="0"/>
-              <a:t>12/14/2024</a:t>
+              <a:t>12/15/2024</a:t>
             </a:fld>
             <a:endParaRPr lang="en-US" dirty="0"/>
           </a:p>
@@ -3803,7 +3807,7 @@
             <a:fld id="{B61BEF0D-F0BB-DE4B-95CE-6DB70DBA9567}" type="datetimeFigureOut">
               <a:rPr lang="en-US" dirty="0"/>
               <a:pPr/>
-              <a:t>12/14/2024</a:t>
+              <a:t>12/15/2024</a:t>
             </a:fld>
             <a:endParaRPr lang="en-US" dirty="0"/>
           </a:p>
@@ -3923,7 +3927,7 @@
             <a:fld id="{B61BEF0D-F0BB-DE4B-95CE-6DB70DBA9567}" type="datetimeFigureOut">
               <a:rPr lang="en-US" dirty="0"/>
               <a:pPr/>
-              <a:t>12/14/2024</a:t>
+              <a:t>12/15/2024</a:t>
             </a:fld>
             <a:endParaRPr lang="en-US" dirty="0"/>
           </a:p>
@@ -4015,7 +4019,7 @@
             <a:fld id="{B61BEF0D-F0BB-DE4B-95CE-6DB70DBA9567}" type="datetimeFigureOut">
               <a:rPr lang="en-US" dirty="0"/>
               <a:pPr/>
-              <a:t>12/14/2024</a:t>
+              <a:t>12/15/2024</a:t>
             </a:fld>
             <a:endParaRPr lang="en-US" dirty="0"/>
           </a:p>
@@ -4266,7 +4270,7 @@
           <a:p>
             <a:fld id="{42A54C80-263E-416B-A8E0-580EDEADCBDC}" type="datetimeFigureOut">
               <a:rPr lang="en-US" dirty="0"/>
-              <a:t>12/14/2024</a:t>
+              <a:t>12/15/2024</a:t>
             </a:fld>
             <a:endParaRPr lang="en-US" dirty="0"/>
           </a:p>
@@ -4568,7 +4572,7 @@
             <a:fld id="{B61BEF0D-F0BB-DE4B-95CE-6DB70DBA9567}" type="datetimeFigureOut">
               <a:rPr lang="en-US" dirty="0"/>
               <a:pPr/>
-              <a:t>12/14/2024</a:t>
+              <a:t>12/15/2024</a:t>
             </a:fld>
             <a:endParaRPr lang="en-US" dirty="0"/>
           </a:p>
@@ -5266,7 +5270,7 @@
             <a:fld id="{B61BEF0D-F0BB-DE4B-95CE-6DB70DBA9567}" type="datetimeFigureOut">
               <a:rPr lang="en-US" dirty="0"/>
               <a:pPr/>
-              <a:t>12/14/2024</a:t>
+              <a:t>12/15/2024</a:t>
             </a:fld>
             <a:endParaRPr lang="en-US" dirty="0"/>
           </a:p>
@@ -5935,6 +5939,300 @@
 </p:sld>
 </file>
 
+<file path=ppt/slides/slide10.xml><?xml version="1.0" encoding="utf-8"?>
+<p:sld xmlns:a="http://schemas.openxmlformats.org/drawingml/2006/main" xmlns:r="http://schemas.openxmlformats.org/officeDocument/2006/relationships" xmlns:p="http://schemas.openxmlformats.org/presentationml/2006/main">
+  <p:cSld>
+    <p:spTree>
+      <p:nvGrpSpPr>
+        <p:cNvPr id="1" name=""/>
+        <p:cNvGrpSpPr/>
+        <p:nvPr/>
+      </p:nvGrpSpPr>
+      <p:grpSpPr>
+        <a:xfrm>
+          <a:off x="0" y="0"/>
+          <a:ext cx="0" cy="0"/>
+          <a:chOff x="0" y="0"/>
+          <a:chExt cx="0" cy="0"/>
+        </a:xfrm>
+      </p:grpSpPr>
+      <p:sp>
+        <p:nvSpPr>
+          <p:cNvPr id="2" name="Title 1"/>
+          <p:cNvSpPr>
+            <a:spLocks noGrp="1"/>
+          </p:cNvSpPr>
+          <p:nvPr>
+            <p:ph type="title"/>
+          </p:nvPr>
+        </p:nvSpPr>
+        <p:spPr>
+          <a:xfrm>
+            <a:off x="677334" y="165463"/>
+            <a:ext cx="8596668" cy="957943"/>
+          </a:xfrm>
+        </p:spPr>
+        <p:txBody>
+          <a:bodyPr/>
+          <a:lstStyle/>
+          <a:p>
+            <a:r>
+              <a:rPr lang="en-US" dirty="0" smtClean="0"/>
+              <a:t>Future Scope :- </a:t>
+            </a:r>
+            <a:endParaRPr lang="en-US" dirty="0"/>
+          </a:p>
+        </p:txBody>
+      </p:sp>
+      <p:sp>
+        <p:nvSpPr>
+          <p:cNvPr id="3" name="Content Placeholder 2"/>
+          <p:cNvSpPr>
+            <a:spLocks noGrp="1"/>
+          </p:cNvSpPr>
+          <p:nvPr>
+            <p:ph idx="1"/>
+          </p:nvPr>
+        </p:nvSpPr>
+        <p:spPr>
+          <a:xfrm>
+            <a:off x="677334" y="1227909"/>
+            <a:ext cx="8596668" cy="4322007"/>
+          </a:xfrm>
+        </p:spPr>
+        <p:txBody>
+          <a:bodyPr/>
+          <a:lstStyle/>
+          <a:p>
+            <a:pPr>
+              <a:buFont typeface="Wingdings" panose="05000000000000000000" pitchFamily="2" charset="2"/>
+              <a:buChar char="Ø"/>
+            </a:pPr>
+            <a:r>
+              <a:rPr lang="en-US" dirty="0"/>
+              <a:t>The </a:t>
+            </a:r>
+            <a:r>
+              <a:rPr lang="en-US" b="1" dirty="0"/>
+              <a:t>Airline Ticket Price Model</a:t>
+            </a:r>
+            <a:r>
+              <a:rPr lang="en-US" dirty="0"/>
+              <a:t> has significant potential for expansion and improvements. As the travel industry continues to evolve, this project can be enhanced to meet growing demands and provide more accurate and dynamic solutions. Below are some areas for future development</a:t>
+            </a:r>
+            <a:r>
+              <a:rPr lang="en-US" dirty="0" smtClean="0"/>
+              <a:t>:</a:t>
+            </a:r>
+          </a:p>
+          <a:p>
+            <a:pPr>
+              <a:buFont typeface="+mj-lt"/>
+              <a:buAutoNum type="arabicParenR"/>
+            </a:pPr>
+            <a:r>
+              <a:rPr lang="en-US" dirty="0"/>
+              <a:t>	</a:t>
+            </a:r>
+            <a:r>
+              <a:rPr lang="en-US" b="1" dirty="0" smtClean="0"/>
+              <a:t> </a:t>
+            </a:r>
+            <a:r>
+              <a:rPr lang="en-US" b="1" dirty="0"/>
+              <a:t>Integration with Real-Time </a:t>
+            </a:r>
+            <a:r>
+              <a:rPr lang="en-US" b="1" dirty="0" smtClean="0"/>
+              <a:t>Data</a:t>
+            </a:r>
+          </a:p>
+          <a:p>
+            <a:pPr>
+              <a:buFont typeface="+mj-lt"/>
+              <a:buAutoNum type="arabicParenR"/>
+            </a:pPr>
+            <a:r>
+              <a:rPr lang="en-US" b="1" dirty="0"/>
+              <a:t> </a:t>
+            </a:r>
+            <a:r>
+              <a:rPr lang="en-US" b="1" dirty="0" smtClean="0"/>
+              <a:t>  User-Focused Applications</a:t>
+            </a:r>
+          </a:p>
+          <a:p>
+            <a:pPr>
+              <a:buFont typeface="+mj-lt"/>
+              <a:buAutoNum type="arabicParenR"/>
+            </a:pPr>
+            <a:r>
+              <a:rPr lang="en-US" b="1" dirty="0"/>
+              <a:t> </a:t>
+            </a:r>
+            <a:r>
+              <a:rPr lang="en-US" b="1" dirty="0" smtClean="0"/>
+              <a:t>  </a:t>
+            </a:r>
+            <a:r>
+              <a:rPr lang="en-US" b="1" dirty="0"/>
+              <a:t>Mobile and Web </a:t>
+            </a:r>
+            <a:r>
+              <a:rPr lang="en-US" b="1" dirty="0" smtClean="0"/>
+              <a:t>Application</a:t>
+            </a:r>
+          </a:p>
+          <a:p>
+            <a:pPr>
+              <a:buFont typeface="+mj-lt"/>
+              <a:buAutoNum type="arabicParenR"/>
+            </a:pPr>
+            <a:endParaRPr lang="en-US" b="1" dirty="0"/>
+          </a:p>
+          <a:p>
+            <a:pPr>
+              <a:buFont typeface="+mj-lt"/>
+              <a:buAutoNum type="arabicParenR"/>
+            </a:pPr>
+            <a:endParaRPr lang="en-US" b="1" dirty="0"/>
+          </a:p>
+          <a:p>
+            <a:pPr>
+              <a:buFont typeface="+mj-lt"/>
+              <a:buAutoNum type="arabicParenR"/>
+            </a:pPr>
+            <a:endParaRPr lang="en-US" b="1" dirty="0"/>
+          </a:p>
+          <a:p>
+            <a:pPr>
+              <a:buFont typeface="+mj-lt"/>
+              <a:buAutoNum type="arabicParenR"/>
+            </a:pPr>
+            <a:endParaRPr lang="en-US" dirty="0"/>
+          </a:p>
+        </p:txBody>
+      </p:sp>
+    </p:spTree>
+    <p:extLst>
+      <p:ext uri="{BB962C8B-B14F-4D97-AF65-F5344CB8AC3E}">
+        <p14:creationId xmlns:p14="http://schemas.microsoft.com/office/powerpoint/2010/main" val="601200109"/>
+      </p:ext>
+    </p:extLst>
+  </p:cSld>
+  <p:clrMapOvr>
+    <a:masterClrMapping/>
+  </p:clrMapOvr>
+  <p:timing>
+    <p:tnLst>
+      <p:par>
+        <p:cTn id="1" dur="indefinite" restart="never" nodeType="tmRoot"/>
+      </p:par>
+    </p:tnLst>
+  </p:timing>
+</p:sld>
+</file>
+
+<file path=ppt/slides/slide11.xml><?xml version="1.0" encoding="utf-8"?>
+<p:sld xmlns:a="http://schemas.openxmlformats.org/drawingml/2006/main" xmlns:r="http://schemas.openxmlformats.org/officeDocument/2006/relationships" xmlns:p="http://schemas.openxmlformats.org/presentationml/2006/main">
+  <p:cSld>
+    <p:spTree>
+      <p:nvGrpSpPr>
+        <p:cNvPr id="1" name=""/>
+        <p:cNvGrpSpPr/>
+        <p:nvPr/>
+      </p:nvGrpSpPr>
+      <p:grpSpPr>
+        <a:xfrm>
+          <a:off x="0" y="0"/>
+          <a:ext cx="0" cy="0"/>
+          <a:chOff x="0" y="0"/>
+          <a:chExt cx="0" cy="0"/>
+        </a:xfrm>
+      </p:grpSpPr>
+      <p:sp>
+        <p:nvSpPr>
+          <p:cNvPr id="2" name="Title 1"/>
+          <p:cNvSpPr>
+            <a:spLocks noGrp="1"/>
+          </p:cNvSpPr>
+          <p:nvPr>
+            <p:ph type="title"/>
+          </p:nvPr>
+        </p:nvSpPr>
+        <p:spPr>
+          <a:xfrm>
+            <a:off x="677334" y="609599"/>
+            <a:ext cx="8596668" cy="4981303"/>
+          </a:xfrm>
+        </p:spPr>
+        <p:txBody>
+          <a:bodyPr>
+            <a:normAutofit/>
+          </a:bodyPr>
+          <a:lstStyle/>
+          <a:p>
+            <a:pPr algn="ctr"/>
+            <a:r>
+              <a:rPr lang="en-US" sz="5400" i="1" dirty="0" smtClean="0">
+                <a:latin typeface="Arial" panose="020B0604020202020204" pitchFamily="34" charset="0"/>
+                <a:cs typeface="Arial" panose="020B0604020202020204" pitchFamily="34" charset="0"/>
+              </a:rPr>
+              <a:t/>
+            </a:r>
+            <a:br>
+              <a:rPr lang="en-US" sz="5400" i="1" dirty="0" smtClean="0">
+                <a:latin typeface="Arial" panose="020B0604020202020204" pitchFamily="34" charset="0"/>
+                <a:cs typeface="Arial" panose="020B0604020202020204" pitchFamily="34" charset="0"/>
+              </a:rPr>
+            </a:br>
+            <a:r>
+              <a:rPr lang="en-US" sz="5400" i="1" dirty="0">
+                <a:latin typeface="Arial" panose="020B0604020202020204" pitchFamily="34" charset="0"/>
+                <a:cs typeface="Arial" panose="020B0604020202020204" pitchFamily="34" charset="0"/>
+              </a:rPr>
+              <a:t/>
+            </a:r>
+            <a:br>
+              <a:rPr lang="en-US" sz="5400" i="1" dirty="0">
+                <a:latin typeface="Arial" panose="020B0604020202020204" pitchFamily="34" charset="0"/>
+                <a:cs typeface="Arial" panose="020B0604020202020204" pitchFamily="34" charset="0"/>
+              </a:rPr>
+            </a:br>
+            <a:r>
+              <a:rPr lang="en-US" sz="5400" i="1" dirty="0" smtClean="0">
+                <a:latin typeface="Arial" panose="020B0604020202020204" pitchFamily="34" charset="0"/>
+                <a:cs typeface="Arial" panose="020B0604020202020204" pitchFamily="34" charset="0"/>
+              </a:rPr>
+              <a:t>Thank You</a:t>
+            </a:r>
+            <a:endParaRPr lang="en-US" sz="5400" i="1" dirty="0">
+              <a:latin typeface="Arial" panose="020B0604020202020204" pitchFamily="34" charset="0"/>
+              <a:cs typeface="Arial" panose="020B0604020202020204" pitchFamily="34" charset="0"/>
+            </a:endParaRPr>
+          </a:p>
+        </p:txBody>
+      </p:sp>
+    </p:spTree>
+    <p:extLst>
+      <p:ext uri="{BB962C8B-B14F-4D97-AF65-F5344CB8AC3E}">
+        <p14:creationId xmlns:p14="http://schemas.microsoft.com/office/powerpoint/2010/main" val="1342935803"/>
+      </p:ext>
+    </p:extLst>
+  </p:cSld>
+  <p:clrMapOvr>
+    <a:masterClrMapping/>
+  </p:clrMapOvr>
+  <p:timing>
+    <p:tnLst>
+      <p:par>
+        <p:cTn id="1" dur="indefinite" restart="never" nodeType="tmRoot"/>
+      </p:par>
+    </p:tnLst>
+  </p:timing>
+</p:sld>
+</file>
+
 <file path=ppt/slides/slide2.xml><?xml version="1.0" encoding="utf-8"?>
 <p:sld xmlns:a="http://schemas.openxmlformats.org/drawingml/2006/main" xmlns:r="http://schemas.openxmlformats.org/officeDocument/2006/relationships" xmlns:p="http://schemas.openxmlformats.org/presentationml/2006/main">
   <p:cSld>
@@ -5988,7 +6286,7 @@
         <p:spPr>
           <a:xfrm>
             <a:off x="572831" y="1507446"/>
-            <a:ext cx="8596668" cy="3880773"/>
+            <a:ext cx="8596668" cy="4671285"/>
           </a:xfrm>
         </p:spPr>
         <p:txBody>
@@ -6058,7 +6356,7 @@
                 <a:latin typeface="Arial" panose="020B0604020202020204" pitchFamily="34" charset="0"/>
                 <a:cs typeface="Arial" panose="020B0604020202020204" pitchFamily="34" charset="0"/>
               </a:rPr>
-              <a:t>ER Diagram</a:t>
+              <a:t>About Project</a:t>
             </a:r>
           </a:p>
           <a:p>
@@ -6071,7 +6369,7 @@
                 <a:latin typeface="Arial" panose="020B0604020202020204" pitchFamily="34" charset="0"/>
                 <a:cs typeface="Arial" panose="020B0604020202020204" pitchFamily="34" charset="0"/>
               </a:rPr>
-              <a:t>Flow</a:t>
+              <a:t>Technology Stack</a:t>
             </a:r>
           </a:p>
           <a:p>
@@ -6084,7 +6382,7 @@
                 <a:latin typeface="Arial" panose="020B0604020202020204" pitchFamily="34" charset="0"/>
                 <a:cs typeface="Arial" panose="020B0604020202020204" pitchFamily="34" charset="0"/>
               </a:rPr>
-              <a:t>Implementation</a:t>
+              <a:t>Database Diagram</a:t>
             </a:r>
           </a:p>
           <a:p>
@@ -6097,8 +6395,30 @@
                 <a:latin typeface="Arial" panose="020B0604020202020204" pitchFamily="34" charset="0"/>
                 <a:cs typeface="Arial" panose="020B0604020202020204" pitchFamily="34" charset="0"/>
               </a:rPr>
-              <a:t>Result</a:t>
-            </a:r>
+              <a:t>ER Diagram</a:t>
+            </a:r>
+          </a:p>
+          <a:p>
+            <a:pPr>
+              <a:buFont typeface="Wingdings" panose="05000000000000000000" pitchFamily="2" charset="2"/>
+              <a:buChar char="v"/>
+            </a:pPr>
+            <a:r>
+              <a:rPr lang="en-US" sz="2400" dirty="0" smtClean="0">
+                <a:latin typeface="Arial" panose="020B0604020202020204" pitchFamily="34" charset="0"/>
+                <a:cs typeface="Arial" panose="020B0604020202020204" pitchFamily="34" charset="0"/>
+              </a:rPr>
+              <a:t>Future Scope</a:t>
+            </a:r>
+          </a:p>
+          <a:p>
+            <a:pPr marL="0" indent="0">
+              <a:buNone/>
+            </a:pPr>
+            <a:endParaRPr lang="en-US" sz="2400" dirty="0" smtClean="0">
+              <a:latin typeface="Arial" panose="020B0604020202020204" pitchFamily="34" charset="0"/>
+              <a:cs typeface="Arial" panose="020B0604020202020204" pitchFamily="34" charset="0"/>
+            </a:endParaRPr>
           </a:p>
         </p:txBody>
       </p:sp>
@@ -6722,38 +7042,44 @@
             <p:ph type="title"/>
           </p:nvPr>
         </p:nvSpPr>
-        <p:spPr/>
-        <p:txBody>
-          <a:bodyPr/>
-          <a:lstStyle/>
-          <a:p>
-            <a:pPr algn="ctr"/>
-            <a:r>
-              <a:rPr lang="en-IN" dirty="0"/>
-              <a:t>Technology Stack</a:t>
-            </a:r>
-            <a:endParaRPr lang="en-US" dirty="0"/>
-          </a:p>
-        </p:txBody>
-      </p:sp>
-      <p:sp>
-        <p:nvSpPr>
-          <p:cNvPr id="3" name="Content Placeholder 2"/>
-          <p:cNvSpPr>
-            <a:spLocks noGrp="1"/>
-          </p:cNvSpPr>
-          <p:nvPr>
-            <p:ph idx="1"/>
-          </p:nvPr>
-        </p:nvSpPr>
         <p:spPr>
           <a:xfrm>
-            <a:off x="677334" y="1376818"/>
+            <a:off x="677334" y="204651"/>
+            <a:ext cx="8596668" cy="918755"/>
+          </a:xfrm>
+        </p:spPr>
+        <p:txBody>
+          <a:bodyPr/>
+          <a:lstStyle/>
+          <a:p>
+            <a:r>
+              <a:rPr lang="en-US" dirty="0" smtClean="0"/>
+              <a:t>About Project :-</a:t>
+            </a:r>
+            <a:endParaRPr lang="en-US" dirty="0"/>
+          </a:p>
+        </p:txBody>
+      </p:sp>
+      <p:sp>
+        <p:nvSpPr>
+          <p:cNvPr id="3" name="Content Placeholder 2"/>
+          <p:cNvSpPr>
+            <a:spLocks noGrp="1"/>
+          </p:cNvSpPr>
+          <p:nvPr>
+            <p:ph idx="1"/>
+          </p:nvPr>
+        </p:nvSpPr>
+        <p:spPr>
+          <a:xfrm>
+            <a:off x="677334" y="1402944"/>
             <a:ext cx="8596668" cy="3880773"/>
           </a:xfrm>
         </p:spPr>
         <p:txBody>
-          <a:bodyPr numCol="1"/>
+          <a:bodyPr>
+            <a:normAutofit/>
+          </a:bodyPr>
           <a:lstStyle/>
           <a:p>
             <a:pPr>
@@ -6761,141 +7087,32 @@
               <a:buChar char="Ø"/>
             </a:pPr>
             <a:r>
-              <a:rPr lang="en-US" sz="2400" b="1" dirty="0" smtClean="0">
+              <a:rPr lang="en-US" sz="2400" dirty="0">
                 <a:latin typeface="Arial" panose="020B0604020202020204" pitchFamily="34" charset="0"/>
                 <a:cs typeface="Arial" panose="020B0604020202020204" pitchFamily="34" charset="0"/>
               </a:rPr>
-              <a:t>Technology</a:t>
-            </a:r>
-          </a:p>
-          <a:p>
-            <a:pPr lvl="1">
-              <a:buFont typeface="Wingdings" panose="05000000000000000000" pitchFamily="2" charset="2"/>
-              <a:buChar char="v"/>
-            </a:pPr>
-            <a:r>
-              <a:rPr lang="en-US" sz="1800" dirty="0" smtClean="0">
-                <a:latin typeface="Arial" panose="020B0604020202020204" pitchFamily="34" charset="0"/>
-                <a:cs typeface="Arial" panose="020B0604020202020204" pitchFamily="34" charset="0"/>
-              </a:rPr>
-              <a:t>Core Java</a:t>
-            </a:r>
-          </a:p>
-          <a:p>
-            <a:pPr lvl="1">
-              <a:buFont typeface="Wingdings" panose="05000000000000000000" pitchFamily="2" charset="2"/>
-              <a:buChar char="v"/>
-            </a:pPr>
-            <a:r>
-              <a:rPr lang="en-US" sz="1800" dirty="0" smtClean="0">
-                <a:latin typeface="Arial" panose="020B0604020202020204" pitchFamily="34" charset="0"/>
-                <a:cs typeface="Arial" panose="020B0604020202020204" pitchFamily="34" charset="0"/>
-              </a:rPr>
-              <a:t>JDK 1.8</a:t>
-            </a:r>
-          </a:p>
-          <a:p>
-            <a:pPr lvl="1">
-              <a:buFont typeface="Wingdings" panose="05000000000000000000" pitchFamily="2" charset="2"/>
-              <a:buChar char="v"/>
-            </a:pPr>
-            <a:r>
-              <a:rPr lang="en-US" sz="1800" dirty="0" smtClean="0">
-                <a:latin typeface="Arial" panose="020B0604020202020204" pitchFamily="34" charset="0"/>
-                <a:cs typeface="Arial" panose="020B0604020202020204" pitchFamily="34" charset="0"/>
-              </a:rPr>
-              <a:t>JDBC</a:t>
-            </a:r>
-          </a:p>
-          <a:p>
-            <a:pPr lvl="1">
-              <a:buFont typeface="Wingdings" panose="05000000000000000000" pitchFamily="2" charset="2"/>
-              <a:buChar char="v"/>
-            </a:pPr>
-            <a:r>
-              <a:rPr lang="en-US" sz="1800" dirty="0" err="1" smtClean="0">
-                <a:latin typeface="Arial" panose="020B0604020202020204" pitchFamily="34" charset="0"/>
-                <a:cs typeface="Arial" panose="020B0604020202020204" pitchFamily="34" charset="0"/>
-              </a:rPr>
-              <a:t>MySql</a:t>
-            </a:r>
-            <a:endParaRPr lang="en-US" sz="1800" dirty="0" smtClean="0">
-              <a:latin typeface="Arial" panose="020B0604020202020204" pitchFamily="34" charset="0"/>
-              <a:cs typeface="Arial" panose="020B0604020202020204" pitchFamily="34" charset="0"/>
-            </a:endParaRPr>
-          </a:p>
-          <a:p>
-            <a:pPr>
-              <a:buFont typeface="Wingdings" panose="05000000000000000000" pitchFamily="2" charset="2"/>
-              <a:buChar char="Ø"/>
-            </a:pPr>
-            <a:r>
-              <a:rPr lang="en-US" sz="2400" b="1" dirty="0" smtClean="0">
-                <a:latin typeface="Arial" panose="020B0604020202020204" pitchFamily="34" charset="0"/>
-                <a:cs typeface="Arial" panose="020B0604020202020204" pitchFamily="34" charset="0"/>
-              </a:rPr>
-              <a:t>Software</a:t>
-            </a:r>
-            <a:r>
-              <a:rPr lang="en-US" dirty="0" smtClean="0"/>
-              <a:t> </a:t>
-            </a:r>
-          </a:p>
-          <a:p>
-            <a:pPr lvl="1">
-              <a:buFont typeface="Wingdings" panose="05000000000000000000" pitchFamily="2" charset="2"/>
-              <a:buChar char="v"/>
-            </a:pPr>
-            <a:r>
-              <a:rPr lang="en-US" sz="1800" dirty="0" smtClean="0">
-                <a:latin typeface="Arial" panose="020B0604020202020204" pitchFamily="34" charset="0"/>
-                <a:cs typeface="Arial" panose="020B0604020202020204" pitchFamily="34" charset="0"/>
-              </a:rPr>
-              <a:t>Eclipse IDE    </a:t>
-            </a:r>
-          </a:p>
-          <a:p>
-            <a:pPr marL="0" indent="0">
-              <a:buNone/>
-            </a:pPr>
-            <a:r>
-              <a:rPr lang="en-US" dirty="0" smtClean="0"/>
-              <a:t>                                           </a:t>
-            </a:r>
-            <a:endParaRPr lang="en-US" dirty="0"/>
-          </a:p>
-          <a:p>
-            <a:pPr lvl="2">
-              <a:buFont typeface="Wingdings" panose="05000000000000000000" pitchFamily="2" charset="2"/>
-              <a:buChar char="v"/>
-            </a:pPr>
-            <a:endParaRPr lang="en-US" dirty="0" smtClean="0"/>
-          </a:p>
-          <a:p>
-            <a:pPr lvl="2">
-              <a:buFont typeface="Wingdings" panose="05000000000000000000" pitchFamily="2" charset="2"/>
-              <a:buChar char="v"/>
-            </a:pPr>
-            <a:endParaRPr lang="en-US" dirty="0"/>
-          </a:p>
-          <a:p>
-            <a:pPr marL="914400" lvl="2" indent="0">
-              <a:buNone/>
-            </a:pPr>
-            <a:endParaRPr lang="en-US" dirty="0" smtClean="0"/>
+              <a:t>The Airline Ticket Price Model aims to analyze and estimate airline ticket prices based on key factors such as booking time, route, flight class, and airline type. This project provides a systematic approach to understanding price fluctuations and patterns without using machine learning algorithms. Instead, it relies on rule-based analysis, statistical methods, and data-driven insights to estimate ticket prices effectively.</a:t>
+            </a:r>
           </a:p>
         </p:txBody>
       </p:sp>
     </p:spTree>
     <p:extLst>
       <p:ext uri="{BB962C8B-B14F-4D97-AF65-F5344CB8AC3E}">
-        <p14:creationId xmlns:p14="http://schemas.microsoft.com/office/powerpoint/2010/main" val="679469175"/>
+        <p14:creationId xmlns:p14="http://schemas.microsoft.com/office/powerpoint/2010/main" val="1449218198"/>
       </p:ext>
     </p:extLst>
   </p:cSld>
   <p:clrMapOvr>
     <a:masterClrMapping/>
   </p:clrMapOvr>
+  <p:timing>
+    <p:tnLst>
+      <p:par>
+        <p:cTn id="1" dur="indefinite" restart="never" nodeType="tmRoot"/>
+      </p:par>
+    </p:tnLst>
+  </p:timing>
 </p:sld>
 </file>
 
@@ -6931,6 +7148,11 @@
           <a:bodyPr/>
           <a:lstStyle/>
           <a:p>
+            <a:pPr algn="ctr"/>
+            <a:r>
+              <a:rPr lang="en-IN" dirty="0"/>
+              <a:t>Technology Stack</a:t>
+            </a:r>
             <a:endParaRPr lang="en-US" dirty="0"/>
           </a:p>
         </p:txBody>
@@ -6945,15 +7167,269 @@
             <p:ph idx="1"/>
           </p:nvPr>
         </p:nvSpPr>
-        <p:spPr/>
+        <p:spPr>
+          <a:xfrm>
+            <a:off x="677334" y="1376818"/>
+            <a:ext cx="8596668" cy="3880773"/>
+          </a:xfrm>
+        </p:spPr>
+        <p:txBody>
+          <a:bodyPr numCol="1"/>
+          <a:lstStyle/>
+          <a:p>
+            <a:pPr>
+              <a:buFont typeface="Wingdings" panose="05000000000000000000" pitchFamily="2" charset="2"/>
+              <a:buChar char="Ø"/>
+            </a:pPr>
+            <a:r>
+              <a:rPr lang="en-US" sz="2400" b="1" dirty="0" smtClean="0">
+                <a:latin typeface="Arial" panose="020B0604020202020204" pitchFamily="34" charset="0"/>
+                <a:cs typeface="Arial" panose="020B0604020202020204" pitchFamily="34" charset="0"/>
+              </a:rPr>
+              <a:t>Technology</a:t>
+            </a:r>
+          </a:p>
+          <a:p>
+            <a:pPr lvl="1">
+              <a:buFont typeface="Wingdings" panose="05000000000000000000" pitchFamily="2" charset="2"/>
+              <a:buChar char="v"/>
+            </a:pPr>
+            <a:r>
+              <a:rPr lang="en-US" sz="1800" dirty="0" smtClean="0">
+                <a:latin typeface="Arial" panose="020B0604020202020204" pitchFamily="34" charset="0"/>
+                <a:cs typeface="Arial" panose="020B0604020202020204" pitchFamily="34" charset="0"/>
+              </a:rPr>
+              <a:t>Core Java</a:t>
+            </a:r>
+          </a:p>
+          <a:p>
+            <a:pPr lvl="1">
+              <a:buFont typeface="Wingdings" panose="05000000000000000000" pitchFamily="2" charset="2"/>
+              <a:buChar char="v"/>
+            </a:pPr>
+            <a:r>
+              <a:rPr lang="en-US" sz="1800" dirty="0" smtClean="0">
+                <a:latin typeface="Arial" panose="020B0604020202020204" pitchFamily="34" charset="0"/>
+                <a:cs typeface="Arial" panose="020B0604020202020204" pitchFamily="34" charset="0"/>
+              </a:rPr>
+              <a:t>JDK 1.8</a:t>
+            </a:r>
+          </a:p>
+          <a:p>
+            <a:pPr lvl="1">
+              <a:buFont typeface="Wingdings" panose="05000000000000000000" pitchFamily="2" charset="2"/>
+              <a:buChar char="v"/>
+            </a:pPr>
+            <a:r>
+              <a:rPr lang="en-US" sz="1800" dirty="0" smtClean="0">
+                <a:latin typeface="Arial" panose="020B0604020202020204" pitchFamily="34" charset="0"/>
+                <a:cs typeface="Arial" panose="020B0604020202020204" pitchFamily="34" charset="0"/>
+              </a:rPr>
+              <a:t>JDBC</a:t>
+            </a:r>
+          </a:p>
+          <a:p>
+            <a:pPr lvl="1">
+              <a:buFont typeface="Wingdings" panose="05000000000000000000" pitchFamily="2" charset="2"/>
+              <a:buChar char="v"/>
+            </a:pPr>
+            <a:r>
+              <a:rPr lang="en-US" sz="1800" dirty="0" err="1" smtClean="0">
+                <a:latin typeface="Arial" panose="020B0604020202020204" pitchFamily="34" charset="0"/>
+                <a:cs typeface="Arial" panose="020B0604020202020204" pitchFamily="34" charset="0"/>
+              </a:rPr>
+              <a:t>MySql</a:t>
+            </a:r>
+            <a:endParaRPr lang="en-US" sz="1800" dirty="0" smtClean="0">
+              <a:latin typeface="Arial" panose="020B0604020202020204" pitchFamily="34" charset="0"/>
+              <a:cs typeface="Arial" panose="020B0604020202020204" pitchFamily="34" charset="0"/>
+            </a:endParaRPr>
+          </a:p>
+          <a:p>
+            <a:pPr>
+              <a:buFont typeface="Wingdings" panose="05000000000000000000" pitchFamily="2" charset="2"/>
+              <a:buChar char="Ø"/>
+            </a:pPr>
+            <a:r>
+              <a:rPr lang="en-US" sz="2400" b="1" dirty="0" smtClean="0">
+                <a:latin typeface="Arial" panose="020B0604020202020204" pitchFamily="34" charset="0"/>
+                <a:cs typeface="Arial" panose="020B0604020202020204" pitchFamily="34" charset="0"/>
+              </a:rPr>
+              <a:t>Tools</a:t>
+            </a:r>
+            <a:endParaRPr lang="en-US" dirty="0" smtClean="0"/>
+          </a:p>
+          <a:p>
+            <a:pPr lvl="1">
+              <a:buFont typeface="Wingdings" panose="05000000000000000000" pitchFamily="2" charset="2"/>
+              <a:buChar char="v"/>
+            </a:pPr>
+            <a:r>
+              <a:rPr lang="en-US" sz="1800" dirty="0" smtClean="0">
+                <a:latin typeface="Arial" panose="020B0604020202020204" pitchFamily="34" charset="0"/>
+                <a:cs typeface="Arial" panose="020B0604020202020204" pitchFamily="34" charset="0"/>
+              </a:rPr>
+              <a:t>Eclipse IDE </a:t>
+            </a:r>
+            <a:endParaRPr lang="en-US" sz="1800" dirty="0" smtClean="0">
+              <a:latin typeface="Arial" panose="020B0604020202020204" pitchFamily="34" charset="0"/>
+              <a:cs typeface="Arial" panose="020B0604020202020204" pitchFamily="34" charset="0"/>
+            </a:endParaRPr>
+          </a:p>
+          <a:p>
+            <a:pPr lvl="1">
+              <a:buFont typeface="Wingdings" panose="05000000000000000000" pitchFamily="2" charset="2"/>
+              <a:buChar char="v"/>
+            </a:pPr>
+            <a:r>
+              <a:rPr lang="en-US" sz="1800" dirty="0" smtClean="0">
+                <a:latin typeface="Arial" panose="020B0604020202020204" pitchFamily="34" charset="0"/>
+                <a:cs typeface="Arial" panose="020B0604020202020204" pitchFamily="34" charset="0"/>
+              </a:rPr>
+              <a:t>Maven</a:t>
+            </a:r>
+          </a:p>
+          <a:p>
+            <a:pPr lvl="1">
+              <a:buFont typeface="Wingdings" panose="05000000000000000000" pitchFamily="2" charset="2"/>
+              <a:buChar char="v"/>
+            </a:pPr>
+            <a:r>
+              <a:rPr lang="en-US" sz="1800" dirty="0" smtClean="0">
+                <a:latin typeface="Arial" panose="020B0604020202020204" pitchFamily="34" charset="0"/>
+                <a:cs typeface="Arial" panose="020B0604020202020204" pitchFamily="34" charset="0"/>
+              </a:rPr>
+              <a:t>GitHub</a:t>
+            </a:r>
+            <a:r>
+              <a:rPr lang="en-US" dirty="0" smtClean="0">
+                <a:latin typeface="Arial" panose="020B0604020202020204" pitchFamily="34" charset="0"/>
+                <a:cs typeface="Arial" panose="020B0604020202020204" pitchFamily="34" charset="0"/>
+              </a:rPr>
+              <a:t>	</a:t>
+            </a:r>
+            <a:r>
+              <a:rPr lang="en-US" dirty="0" smtClean="0"/>
+              <a:t>                                           </a:t>
+            </a:r>
+            <a:endParaRPr lang="en-US" dirty="0"/>
+          </a:p>
+          <a:p>
+            <a:pPr lvl="2">
+              <a:buFont typeface="Wingdings" panose="05000000000000000000" pitchFamily="2" charset="2"/>
+              <a:buChar char="v"/>
+            </a:pPr>
+            <a:endParaRPr lang="en-US" dirty="0" smtClean="0"/>
+          </a:p>
+          <a:p>
+            <a:pPr lvl="2">
+              <a:buFont typeface="Wingdings" panose="05000000000000000000" pitchFamily="2" charset="2"/>
+              <a:buChar char="v"/>
+            </a:pPr>
+            <a:endParaRPr lang="en-US" dirty="0"/>
+          </a:p>
+          <a:p>
+            <a:pPr marL="914400" lvl="2" indent="0">
+              <a:buNone/>
+            </a:pPr>
+            <a:endParaRPr lang="en-US" dirty="0" smtClean="0"/>
+          </a:p>
+        </p:txBody>
+      </p:sp>
+    </p:spTree>
+    <p:extLst>
+      <p:ext uri="{BB962C8B-B14F-4D97-AF65-F5344CB8AC3E}">
+        <p14:creationId xmlns:p14="http://schemas.microsoft.com/office/powerpoint/2010/main" val="679469175"/>
+      </p:ext>
+    </p:extLst>
+  </p:cSld>
+  <p:clrMapOvr>
+    <a:masterClrMapping/>
+  </p:clrMapOvr>
+  <p:timing>
+    <p:tnLst>
+      <p:par>
+        <p:cTn id="1" dur="indefinite" restart="never" nodeType="tmRoot"/>
+      </p:par>
+    </p:tnLst>
+  </p:timing>
+</p:sld>
+</file>
+
+<file path=ppt/slides/slide8.xml><?xml version="1.0" encoding="utf-8"?>
+<p:sld xmlns:a="http://schemas.openxmlformats.org/drawingml/2006/main" xmlns:r="http://schemas.openxmlformats.org/officeDocument/2006/relationships" xmlns:p="http://schemas.openxmlformats.org/presentationml/2006/main">
+  <p:cSld>
+    <p:spTree>
+      <p:nvGrpSpPr>
+        <p:cNvPr id="1" name=""/>
+        <p:cNvGrpSpPr/>
+        <p:nvPr/>
+      </p:nvGrpSpPr>
+      <p:grpSpPr>
+        <a:xfrm>
+          <a:off x="0" y="0"/>
+          <a:ext cx="0" cy="0"/>
+          <a:chOff x="0" y="0"/>
+          <a:chExt cx="0" cy="0"/>
+        </a:xfrm>
+      </p:grpSpPr>
+      <p:sp>
+        <p:nvSpPr>
+          <p:cNvPr id="2" name="Title 1"/>
+          <p:cNvSpPr>
+            <a:spLocks noGrp="1"/>
+          </p:cNvSpPr>
+          <p:nvPr>
+            <p:ph type="title"/>
+          </p:nvPr>
+        </p:nvSpPr>
+        <p:spPr>
+          <a:xfrm>
+            <a:off x="677334" y="0"/>
+            <a:ext cx="8596668" cy="770709"/>
+          </a:xfrm>
+        </p:spPr>
         <p:txBody>
           <a:bodyPr/>
           <a:lstStyle/>
           <a:p>
-            <a:endParaRPr lang="en-US"/>
-          </a:p>
-        </p:txBody>
-      </p:sp>
+            <a:r>
+              <a:rPr lang="en-US" dirty="0" smtClean="0"/>
+              <a:t>Database Diagram :-</a:t>
+            </a:r>
+            <a:endParaRPr lang="en-US" dirty="0"/>
+          </a:p>
+        </p:txBody>
+      </p:sp>
+      <p:pic>
+        <p:nvPicPr>
+          <p:cNvPr id="4" name="Content Placeholder 3"/>
+          <p:cNvPicPr>
+            <a:picLocks noGrp="1" noChangeAspect="1"/>
+          </p:cNvPicPr>
+          <p:nvPr>
+            <p:ph idx="1"/>
+          </p:nvPr>
+        </p:nvPicPr>
+        <p:blipFill>
+          <a:blip r:embed="rId2">
+            <a:extLst>
+              <a:ext uri="{28A0092B-C50C-407E-A947-70E740481C1C}">
+                <a14:useLocalDpi xmlns:a14="http://schemas.microsoft.com/office/drawing/2010/main" val="0"/>
+              </a:ext>
+            </a:extLst>
+          </a:blip>
+          <a:stretch>
+            <a:fillRect/>
+          </a:stretch>
+        </p:blipFill>
+        <p:spPr>
+          <a:xfrm>
+            <a:off x="1136470" y="770709"/>
+            <a:ext cx="7707084" cy="5747657"/>
+          </a:xfrm>
+        </p:spPr>
+      </p:pic>
     </p:spTree>
     <p:extLst>
       <p:ext uri="{BB962C8B-B14F-4D97-AF65-F5344CB8AC3E}">
@@ -6964,6 +7440,107 @@
   <p:clrMapOvr>
     <a:masterClrMapping/>
   </p:clrMapOvr>
+  <p:timing>
+    <p:tnLst>
+      <p:par>
+        <p:cTn id="1" dur="indefinite" restart="never" nodeType="tmRoot"/>
+      </p:par>
+    </p:tnLst>
+  </p:timing>
+</p:sld>
+</file>
+
+<file path=ppt/slides/slide9.xml><?xml version="1.0" encoding="utf-8"?>
+<p:sld xmlns:a="http://schemas.openxmlformats.org/drawingml/2006/main" xmlns:r="http://schemas.openxmlformats.org/officeDocument/2006/relationships" xmlns:p="http://schemas.openxmlformats.org/presentationml/2006/main">
+  <p:cSld>
+    <p:spTree>
+      <p:nvGrpSpPr>
+        <p:cNvPr id="1" name=""/>
+        <p:cNvGrpSpPr/>
+        <p:nvPr/>
+      </p:nvGrpSpPr>
+      <p:grpSpPr>
+        <a:xfrm>
+          <a:off x="0" y="0"/>
+          <a:ext cx="0" cy="0"/>
+          <a:chOff x="0" y="0"/>
+          <a:chExt cx="0" cy="0"/>
+        </a:xfrm>
+      </p:grpSpPr>
+      <p:sp>
+        <p:nvSpPr>
+          <p:cNvPr id="2" name="Title 1"/>
+          <p:cNvSpPr>
+            <a:spLocks noGrp="1"/>
+          </p:cNvSpPr>
+          <p:nvPr>
+            <p:ph type="title"/>
+          </p:nvPr>
+        </p:nvSpPr>
+        <p:spPr>
+          <a:xfrm>
+            <a:off x="677334" y="0"/>
+            <a:ext cx="8596668" cy="783771"/>
+          </a:xfrm>
+        </p:spPr>
+        <p:txBody>
+          <a:bodyPr/>
+          <a:lstStyle/>
+          <a:p>
+            <a:r>
+              <a:rPr lang="en-US" dirty="0" smtClean="0"/>
+              <a:t>ER Diagram :- </a:t>
+            </a:r>
+            <a:endParaRPr lang="en-US" dirty="0"/>
+          </a:p>
+        </p:txBody>
+      </p:sp>
+      <p:pic>
+        <p:nvPicPr>
+          <p:cNvPr id="4" name="Content Placeholder 3"/>
+          <p:cNvPicPr>
+            <a:picLocks noGrp="1" noChangeAspect="1"/>
+          </p:cNvPicPr>
+          <p:nvPr>
+            <p:ph idx="1"/>
+          </p:nvPr>
+        </p:nvPicPr>
+        <p:blipFill>
+          <a:blip r:embed="rId2">
+            <a:extLst>
+              <a:ext uri="{28A0092B-C50C-407E-A947-70E740481C1C}">
+                <a14:useLocalDpi xmlns:a14="http://schemas.microsoft.com/office/drawing/2010/main" val="0"/>
+              </a:ext>
+            </a:extLst>
+          </a:blip>
+          <a:stretch>
+            <a:fillRect/>
+          </a:stretch>
+        </p:blipFill>
+        <p:spPr>
+          <a:xfrm>
+            <a:off x="1769900" y="914400"/>
+            <a:ext cx="6412237" cy="5127625"/>
+          </a:xfrm>
+        </p:spPr>
+      </p:pic>
+    </p:spTree>
+    <p:extLst>
+      <p:ext uri="{BB962C8B-B14F-4D97-AF65-F5344CB8AC3E}">
+        <p14:creationId xmlns:p14="http://schemas.microsoft.com/office/powerpoint/2010/main" val="4260870043"/>
+      </p:ext>
+    </p:extLst>
+  </p:cSld>
+  <p:clrMapOvr>
+    <a:masterClrMapping/>
+  </p:clrMapOvr>
+  <p:timing>
+    <p:tnLst>
+      <p:par>
+        <p:cTn id="1" dur="indefinite" restart="never" nodeType="tmRoot"/>
+      </p:par>
+    </p:tnLst>
+  </p:timing>
 </p:sld>
 </file>
 

</xml_diff>